<commit_message>
Fixed a typo in final presentation
</commit_message>
<xml_diff>
--- a/orga/GDIS_Final_Presentation.pptx
+++ b/orga/GDIS_Final_Presentation.pptx
@@ -3964,11 +3964,15 @@
             </a:pPr>
             <a:r>
               <a:rPr lang="en-US" dirty="0"/>
-              <a:t>d</a:t>
+              <a:t>D</a:t>
+            </a:r>
+            <a:r>
+              <a:rPr lang="de-DE"/>
+              <a:t>er </a:t>
             </a:r>
             <a:r>
               <a:rPr lang="de-DE" dirty="0"/>
-              <a:t>er gleiche Bearbeitungsauftrag mehrmals mit verschiedenen Datenkonstellationen getestet werden</a:t>
+              <a:t>gleiche Bearbeitungsauftrag mehrmals mit verschiedenen Datenkonstellationen getestet werden</a:t>
             </a:r>
           </a:p>
           <a:p>

</xml_diff>